<commit_message>
updated user aprom offset 0x4000
</commit_message>
<xml_diff>
--- a/m2u54 aes boot.pptx
+++ b/m2u54 aes boot.pptx
@@ -117,6 +117,11 @@
       </a:defRPr>
     </a:lvl9pPr>
   </p:defaultTextStyle>
+  <p:extLst>
+    <p:ext uri="{EFAFB233-063F-42B5-8137-9DF3F51BA10A}">
+      <p15:sldGuideLst xmlns:p15="http://schemas.microsoft.com/office/powerpoint/2012/main"/>
+    </p:ext>
+  </p:extLst>
 </p:presentation>
 </file>
 
@@ -267,7 +272,7 @@
           <a:p>
             <a:fld id="{6B5F5F2D-C02A-423E-B7EE-AAB13A2A8036}" type="datetimeFigureOut">
               <a:rPr lang="en-US" smtClean="0"/>
-              <a:t>2/4/2026</a:t>
+              <a:t>2/9/2026</a:t>
             </a:fld>
             <a:endParaRPr lang="en-US"/>
           </a:p>
@@ -465,7 +470,7 @@
           <a:p>
             <a:fld id="{6B5F5F2D-C02A-423E-B7EE-AAB13A2A8036}" type="datetimeFigureOut">
               <a:rPr lang="en-US" smtClean="0"/>
-              <a:t>2/4/2026</a:t>
+              <a:t>2/9/2026</a:t>
             </a:fld>
             <a:endParaRPr lang="en-US"/>
           </a:p>
@@ -673,7 +678,7 @@
           <a:p>
             <a:fld id="{6B5F5F2D-C02A-423E-B7EE-AAB13A2A8036}" type="datetimeFigureOut">
               <a:rPr lang="en-US" smtClean="0"/>
-              <a:t>2/4/2026</a:t>
+              <a:t>2/9/2026</a:t>
             </a:fld>
             <a:endParaRPr lang="en-US"/>
           </a:p>
@@ -871,7 +876,7 @@
           <a:p>
             <a:fld id="{6B5F5F2D-C02A-423E-B7EE-AAB13A2A8036}" type="datetimeFigureOut">
               <a:rPr lang="en-US" smtClean="0"/>
-              <a:t>2/4/2026</a:t>
+              <a:t>2/9/2026</a:t>
             </a:fld>
             <a:endParaRPr lang="en-US"/>
           </a:p>
@@ -1146,7 +1151,7 @@
           <a:p>
             <a:fld id="{6B5F5F2D-C02A-423E-B7EE-AAB13A2A8036}" type="datetimeFigureOut">
               <a:rPr lang="en-US" smtClean="0"/>
-              <a:t>2/4/2026</a:t>
+              <a:t>2/9/2026</a:t>
             </a:fld>
             <a:endParaRPr lang="en-US"/>
           </a:p>
@@ -1411,7 +1416,7 @@
           <a:p>
             <a:fld id="{6B5F5F2D-C02A-423E-B7EE-AAB13A2A8036}" type="datetimeFigureOut">
               <a:rPr lang="en-US" smtClean="0"/>
-              <a:t>2/4/2026</a:t>
+              <a:t>2/9/2026</a:t>
             </a:fld>
             <a:endParaRPr lang="en-US"/>
           </a:p>
@@ -1823,7 +1828,7 @@
           <a:p>
             <a:fld id="{6B5F5F2D-C02A-423E-B7EE-AAB13A2A8036}" type="datetimeFigureOut">
               <a:rPr lang="en-US" smtClean="0"/>
-              <a:t>2/4/2026</a:t>
+              <a:t>2/9/2026</a:t>
             </a:fld>
             <a:endParaRPr lang="en-US"/>
           </a:p>
@@ -1964,7 +1969,7 @@
           <a:p>
             <a:fld id="{6B5F5F2D-C02A-423E-B7EE-AAB13A2A8036}" type="datetimeFigureOut">
               <a:rPr lang="en-US" smtClean="0"/>
-              <a:t>2/4/2026</a:t>
+              <a:t>2/9/2026</a:t>
             </a:fld>
             <a:endParaRPr lang="en-US"/>
           </a:p>
@@ -2077,7 +2082,7 @@
           <a:p>
             <a:fld id="{6B5F5F2D-C02A-423E-B7EE-AAB13A2A8036}" type="datetimeFigureOut">
               <a:rPr lang="en-US" smtClean="0"/>
-              <a:t>2/4/2026</a:t>
+              <a:t>2/9/2026</a:t>
             </a:fld>
             <a:endParaRPr lang="en-US"/>
           </a:p>
@@ -2388,7 +2393,7 @@
           <a:p>
             <a:fld id="{6B5F5F2D-C02A-423E-B7EE-AAB13A2A8036}" type="datetimeFigureOut">
               <a:rPr lang="en-US" smtClean="0"/>
-              <a:t>2/4/2026</a:t>
+              <a:t>2/9/2026</a:t>
             </a:fld>
             <a:endParaRPr lang="en-US"/>
           </a:p>
@@ -2676,7 +2681,7 @@
           <a:p>
             <a:fld id="{6B5F5F2D-C02A-423E-B7EE-AAB13A2A8036}" type="datetimeFigureOut">
               <a:rPr lang="en-US" smtClean="0"/>
-              <a:t>2/4/2026</a:t>
+              <a:t>2/9/2026</a:t>
             </a:fld>
             <a:endParaRPr lang="en-US"/>
           </a:p>
@@ -2917,7 +2922,7 @@
           <a:p>
             <a:fld id="{6B5F5F2D-C02A-423E-B7EE-AAB13A2A8036}" type="datetimeFigureOut">
               <a:rPr lang="en-US" smtClean="0"/>
-              <a:t>2/4/2026</a:t>
+              <a:t>2/9/2026</a:t>
             </a:fld>
             <a:endParaRPr lang="en-US"/>
           </a:p>
@@ -4151,45 +4156,12 @@
           <a:chExt cx="0" cy="0"/>
         </a:xfrm>
       </p:grpSpPr>
-      <p:sp>
-        <p:nvSpPr>
-          <p:cNvPr id="2" name="Title 1">
-            <a:extLst>
-              <a:ext uri="{FF2B5EF4-FFF2-40B4-BE49-F238E27FC236}">
-                <a16:creationId xmlns:a16="http://schemas.microsoft.com/office/drawing/2014/main" id="{53890B15-E18B-270C-6AD7-A51D7F47EF97}"/>
-              </a:ext>
-            </a:extLst>
-          </p:cNvPr>
-          <p:cNvSpPr>
-            <a:spLocks noGrp="1"/>
-          </p:cNvSpPr>
-          <p:nvPr>
-            <p:ph type="title"/>
-          </p:nvPr>
-        </p:nvSpPr>
-        <p:spPr>
-          <a:xfrm>
-            <a:off x="838200" y="-297657"/>
-            <a:ext cx="10515600" cy="1325563"/>
-          </a:xfrm>
-        </p:spPr>
-        <p:txBody>
-          <a:bodyPr/>
-          <a:lstStyle/>
-          <a:p>
-            <a:r>
-              <a:rPr lang="en-US" dirty="0"/>
-              <a:t>Programming APROM</a:t>
-            </a:r>
-          </a:p>
-        </p:txBody>
-      </p:sp>
       <p:pic>
         <p:nvPicPr>
-          <p:cNvPr id="5" name="Picture 4">
-            <a:extLst>
-              <a:ext uri="{FF2B5EF4-FFF2-40B4-BE49-F238E27FC236}">
-                <a16:creationId xmlns:a16="http://schemas.microsoft.com/office/drawing/2014/main" id="{9A63F570-70A3-1BA2-A44F-D188E11ADDBD}"/>
+          <p:cNvPr id="4" name="Picture 3">
+            <a:extLst>
+              <a:ext uri="{FF2B5EF4-FFF2-40B4-BE49-F238E27FC236}">
+                <a16:creationId xmlns:a16="http://schemas.microsoft.com/office/drawing/2014/main" id="{CA20C4FA-5970-2751-40EB-BB6F00EEE73D}"/>
               </a:ext>
             </a:extLst>
           </p:cNvPr>
@@ -4206,14 +4178,47 @@
         </p:blipFill>
         <p:spPr>
           <a:xfrm>
-            <a:off x="0" y="636872"/>
-            <a:ext cx="9385092" cy="6221128"/>
+            <a:off x="218039" y="813913"/>
+            <a:ext cx="8416363" cy="5623268"/>
           </a:xfrm>
           <a:prstGeom prst="rect">
             <a:avLst/>
           </a:prstGeom>
         </p:spPr>
       </p:pic>
+      <p:sp>
+        <p:nvSpPr>
+          <p:cNvPr id="2" name="Title 1">
+            <a:extLst>
+              <a:ext uri="{FF2B5EF4-FFF2-40B4-BE49-F238E27FC236}">
+                <a16:creationId xmlns:a16="http://schemas.microsoft.com/office/drawing/2014/main" id="{53890B15-E18B-270C-6AD7-A51D7F47EF97}"/>
+              </a:ext>
+            </a:extLst>
+          </p:cNvPr>
+          <p:cNvSpPr>
+            <a:spLocks noGrp="1"/>
+          </p:cNvSpPr>
+          <p:nvPr>
+            <p:ph type="title"/>
+          </p:nvPr>
+        </p:nvSpPr>
+        <p:spPr>
+          <a:xfrm>
+            <a:off x="838200" y="-297657"/>
+            <a:ext cx="10515600" cy="1325563"/>
+          </a:xfrm>
+        </p:spPr>
+        <p:txBody>
+          <a:bodyPr/>
+          <a:lstStyle/>
+          <a:p>
+            <a:r>
+              <a:rPr lang="en-US" dirty="0"/>
+              <a:t>Programming APROM</a:t>
+            </a:r>
+          </a:p>
+        </p:txBody>
+      </p:sp>
       <p:cxnSp>
         <p:nvCxnSpPr>
           <p:cNvPr id="7" name="Straight Arrow Connector 6">
@@ -4268,7 +4273,7 @@
         <p:spPr>
           <a:xfrm>
             <a:off x="8199620" y="1958927"/>
-            <a:ext cx="1970796" cy="369332"/>
+            <a:ext cx="2670668" cy="369332"/>
           </a:xfrm>
           <a:prstGeom prst="rect">
             <a:avLst/>
@@ -4283,7 +4288,7 @@
           <a:p>
             <a:r>
               <a:rPr lang="en-US" dirty="0"/>
-              <a:t>USER APROM.BIN</a:t>
+              <a:t>firmware_signed_64k.bin</a:t>
             </a:r>
           </a:p>
         </p:txBody>
@@ -4460,6 +4465,58 @@
           <a:xfrm>
             <a:off x="659567" y="2492159"/>
             <a:ext cx="704538" cy="970570"/>
+          </a:xfrm>
+          <a:prstGeom prst="rect">
+            <a:avLst/>
+          </a:prstGeom>
+          <a:noFill/>
+          <a:ln>
+            <a:solidFill>
+              <a:srgbClr val="FF0000"/>
+            </a:solidFill>
+          </a:ln>
+        </p:spPr>
+        <p:style>
+          <a:lnRef idx="2">
+            <a:schemeClr val="accent1">
+              <a:shade val="15000"/>
+            </a:schemeClr>
+          </a:lnRef>
+          <a:fillRef idx="1">
+            <a:schemeClr val="accent1"/>
+          </a:fillRef>
+          <a:effectRef idx="0">
+            <a:schemeClr val="accent1"/>
+          </a:effectRef>
+          <a:fontRef idx="minor">
+            <a:schemeClr val="lt1"/>
+          </a:fontRef>
+        </p:style>
+        <p:txBody>
+          <a:bodyPr rtlCol="0" anchor="ctr"/>
+          <a:lstStyle/>
+          <a:p>
+            <a:pPr algn="ctr"/>
+            <a:endParaRPr lang="en-US"/>
+          </a:p>
+        </p:txBody>
+      </p:sp>
+      <p:sp>
+        <p:nvSpPr>
+          <p:cNvPr id="6" name="Rectangle 5">
+            <a:extLst>
+              <a:ext uri="{FF2B5EF4-FFF2-40B4-BE49-F238E27FC236}">
+                <a16:creationId xmlns:a16="http://schemas.microsoft.com/office/drawing/2014/main" id="{6D4FD4B8-D36C-3C40-22E6-AF579E291E62}"/>
+              </a:ext>
+            </a:extLst>
+          </p:cNvPr>
+          <p:cNvSpPr/>
+          <p:nvPr/>
+        </p:nvSpPr>
+        <p:spPr>
+          <a:xfrm>
+            <a:off x="7067862" y="813913"/>
+            <a:ext cx="1911246" cy="670112"/>
           </a:xfrm>
           <a:prstGeom prst="rect">
             <a:avLst/>
@@ -5120,7 +5177,7 @@
           <a:p>
             <a:r>
               <a:rPr lang="en-US" dirty="0"/>
-              <a:t>0x3000</a:t>
+              <a:t>0x4000</a:t>
             </a:r>
           </a:p>
         </p:txBody>
@@ -5231,7 +5288,7 @@
           <a:p>
             <a:r>
               <a:rPr lang="en-US" dirty="0"/>
-              <a:t>0x13000</a:t>
+              <a:t>0x14000</a:t>
             </a:r>
           </a:p>
         </p:txBody>
@@ -6083,57 +6140,19 @@
           <a:chExt cx="0" cy="0"/>
         </a:xfrm>
       </p:grpSpPr>
-      <p:sp>
-        <p:nvSpPr>
-          <p:cNvPr id="2" name="Title 1">
-            <a:extLst>
-              <a:ext uri="{FF2B5EF4-FFF2-40B4-BE49-F238E27FC236}">
-                <a16:creationId xmlns:a16="http://schemas.microsoft.com/office/drawing/2014/main" id="{FE728F71-F942-E23B-8456-882133EDE28C}"/>
-              </a:ext>
-            </a:extLst>
-          </p:cNvPr>
-          <p:cNvSpPr>
-            <a:spLocks noGrp="1"/>
-          </p:cNvSpPr>
-          <p:nvPr>
-            <p:ph type="title"/>
-          </p:nvPr>
-        </p:nvSpPr>
-        <p:spPr/>
-        <p:txBody>
-          <a:bodyPr/>
-          <a:lstStyle/>
-          <a:p>
-            <a:r>
-              <a:rPr lang="en-US" dirty="0"/>
-              <a:t>User APROM Project (RO and </a:t>
-            </a:r>
-            <a:r>
-              <a:rPr lang="en-US" dirty="0" err="1"/>
-              <a:t>scf</a:t>
-            </a:r>
-            <a:r>
-              <a:rPr lang="en-US" dirty="0"/>
-              <a:t> file)</a:t>
-            </a:r>
-          </a:p>
-        </p:txBody>
-      </p:sp>
       <p:pic>
         <p:nvPicPr>
-          <p:cNvPr id="9" name="Content Placeholder 8">
-            <a:extLst>
-              <a:ext uri="{FF2B5EF4-FFF2-40B4-BE49-F238E27FC236}">
-                <a16:creationId xmlns:a16="http://schemas.microsoft.com/office/drawing/2014/main" id="{14F85648-46C7-68E7-3909-DE9E7E9268D9}"/>
+          <p:cNvPr id="14" name="Picture 13">
+            <a:extLst>
+              <a:ext uri="{FF2B5EF4-FFF2-40B4-BE49-F238E27FC236}">
+                <a16:creationId xmlns:a16="http://schemas.microsoft.com/office/drawing/2014/main" id="{67B815B2-4490-B2AD-0ECF-731055CA2312}"/>
               </a:ext>
             </a:extLst>
           </p:cNvPr>
           <p:cNvPicPr>
-            <a:picLocks noGrp="1" noChangeAspect="1"/>
+            <a:picLocks noChangeAspect="1"/>
           </p:cNvPicPr>
-          <p:nvPr>
-            <p:ph idx="1"/>
-          </p:nvPr>
+          <p:nvPr/>
         </p:nvPicPr>
         <p:blipFill>
           <a:blip r:embed="rId2"/>
@@ -6143,8 +6162,8 @@
         </p:blipFill>
         <p:spPr>
           <a:xfrm>
-            <a:off x="7990802" y="1690688"/>
-            <a:ext cx="4020111" cy="3477110"/>
+            <a:off x="8114731" y="2797721"/>
+            <a:ext cx="4077269" cy="3105583"/>
           </a:xfrm>
           <a:prstGeom prst="rect">
             <a:avLst/>
@@ -6153,10 +6172,10 @@
       </p:pic>
       <p:pic>
         <p:nvPicPr>
-          <p:cNvPr id="5" name="Picture 4">
-            <a:extLst>
-              <a:ext uri="{FF2B5EF4-FFF2-40B4-BE49-F238E27FC236}">
-                <a16:creationId xmlns:a16="http://schemas.microsoft.com/office/drawing/2014/main" id="{6A4B687B-9334-CF36-F6F3-71311D9945B8}"/>
+          <p:cNvPr id="4" name="Picture 3">
+            <a:extLst>
+              <a:ext uri="{FF2B5EF4-FFF2-40B4-BE49-F238E27FC236}">
+                <a16:creationId xmlns:a16="http://schemas.microsoft.com/office/drawing/2014/main" id="{901FBA9E-E6D6-C17D-8D69-3D5E68421B78}"/>
               </a:ext>
             </a:extLst>
           </p:cNvPr>
@@ -6173,8 +6192,8 @@
         </p:blipFill>
         <p:spPr>
           <a:xfrm>
-            <a:off x="509643" y="1344422"/>
-            <a:ext cx="7152602" cy="5296547"/>
+            <a:off x="551145" y="2165172"/>
+            <a:ext cx="5992061" cy="4039164"/>
           </a:xfrm>
           <a:prstGeom prst="rect">
             <a:avLst/>
@@ -6183,6 +6202,42 @@
       </p:pic>
       <p:sp>
         <p:nvSpPr>
+          <p:cNvPr id="2" name="Title 1">
+            <a:extLst>
+              <a:ext uri="{FF2B5EF4-FFF2-40B4-BE49-F238E27FC236}">
+                <a16:creationId xmlns:a16="http://schemas.microsoft.com/office/drawing/2014/main" id="{FE728F71-F942-E23B-8456-882133EDE28C}"/>
+              </a:ext>
+            </a:extLst>
+          </p:cNvPr>
+          <p:cNvSpPr>
+            <a:spLocks noGrp="1"/>
+          </p:cNvSpPr>
+          <p:nvPr>
+            <p:ph type="title"/>
+          </p:nvPr>
+        </p:nvSpPr>
+        <p:spPr/>
+        <p:txBody>
+          <a:bodyPr/>
+          <a:lstStyle/>
+          <a:p>
+            <a:r>
+              <a:rPr lang="en-US" dirty="0"/>
+              <a:t>User APROM Project (RO and </a:t>
+            </a:r>
+            <a:r>
+              <a:rPr lang="en-US" dirty="0" err="1"/>
+              <a:t>scf</a:t>
+            </a:r>
+            <a:r>
+              <a:rPr lang="en-US" dirty="0"/>
+              <a:t> file)</a:t>
+            </a:r>
+          </a:p>
+        </p:txBody>
+      </p:sp>
+      <p:sp>
+        <p:nvSpPr>
           <p:cNvPr id="6" name="Rectangle 5">
             <a:extLst>
               <a:ext uri="{FF2B5EF4-FFF2-40B4-BE49-F238E27FC236}">
@@ -6195,8 +6250,8 @@
         </p:nvSpPr>
         <p:spPr>
           <a:xfrm>
-            <a:off x="4008721" y="2353456"/>
-            <a:ext cx="2452039" cy="331519"/>
+            <a:off x="3655103" y="2936019"/>
+            <a:ext cx="1996190" cy="214549"/>
           </a:xfrm>
           <a:prstGeom prst="rect">
             <a:avLst/>
@@ -6281,7 +6336,7 @@
           <a:lstStyle/>
           <a:p>
             <a:pPr algn="ctr"/>
-            <a:endParaRPr lang="en-US"/>
+            <a:endParaRPr lang="en-US" dirty="0"/>
           </a:p>
         </p:txBody>
       </p:sp>

</xml_diff>